<commit_message>
minor update on powerpoint
</commit_message>
<xml_diff>
--- a/presentations/ML_on_dotnetcore.pptx
+++ b/presentations/ML_on_dotnetcore.pptx
@@ -117,6 +117,11 @@
       </a:defRPr>
     </a:lvl9pPr>
   </p:defaultTextStyle>
+  <p:extLst>
+    <p:ext uri="{EFAFB233-063F-42B5-8137-9DF3F51BA10A}">
+      <p15:sldGuideLst xmlns:p15="http://schemas.microsoft.com/office/powerpoint/2012/main"/>
+    </p:ext>
+  </p:extLst>
 </p:presentation>
 </file>
 
@@ -309,7 +314,7 @@
             <a:fld id="{B61BEF0D-F0BB-DE4B-95CE-6DB70DBA9567}" type="datetimeFigureOut">
               <a:rPr lang="en-US" dirty="0"/>
               <a:pPr/>
-              <a:t>11/10/2019</a:t>
+              <a:t>11/16/2019</a:t>
             </a:fld>
             <a:endParaRPr lang="en-US" dirty="0"/>
           </a:p>
@@ -644,7 +649,7 @@
             <a:fld id="{B61BEF0D-F0BB-DE4B-95CE-6DB70DBA9567}" type="datetimeFigureOut">
               <a:rPr lang="en-US" dirty="0"/>
               <a:pPr/>
-              <a:t>11/10/2019</a:t>
+              <a:t>11/16/2019</a:t>
             </a:fld>
             <a:endParaRPr lang="en-US" dirty="0"/>
           </a:p>
@@ -1042,7 +1047,7 @@
             <a:fld id="{B61BEF0D-F0BB-DE4B-95CE-6DB70DBA9567}" type="datetimeFigureOut">
               <a:rPr lang="en-US" dirty="0"/>
               <a:pPr/>
-              <a:t>11/10/2019</a:t>
+              <a:t>11/16/2019</a:t>
             </a:fld>
             <a:endParaRPr lang="en-US" dirty="0"/>
           </a:p>
@@ -1375,7 +1380,7 @@
             <a:fld id="{B61BEF0D-F0BB-DE4B-95CE-6DB70DBA9567}" type="datetimeFigureOut">
               <a:rPr lang="en-US" dirty="0"/>
               <a:pPr/>
-              <a:t>11/10/2019</a:t>
+              <a:t>11/16/2019</a:t>
             </a:fld>
             <a:endParaRPr lang="en-US" dirty="0"/>
           </a:p>
@@ -1692,7 +1697,7 @@
             <a:fld id="{B61BEF0D-F0BB-DE4B-95CE-6DB70DBA9567}" type="datetimeFigureOut">
               <a:rPr lang="en-US" dirty="0"/>
               <a:pPr/>
-              <a:t>11/10/2019</a:t>
+              <a:t>11/16/2019</a:t>
             </a:fld>
             <a:endParaRPr lang="en-US" dirty="0"/>
           </a:p>
@@ -2085,7 +2090,7 @@
             <a:fld id="{B61BEF0D-F0BB-DE4B-95CE-6DB70DBA9567}" type="datetimeFigureOut">
               <a:rPr lang="en-US" dirty="0"/>
               <a:pPr/>
-              <a:t>11/10/2019</a:t>
+              <a:t>11/16/2019</a:t>
             </a:fld>
             <a:endParaRPr lang="en-US" dirty="0"/>
           </a:p>
@@ -2339,7 +2344,7 @@
             <a:fld id="{B61BEF0D-F0BB-DE4B-95CE-6DB70DBA9567}" type="datetimeFigureOut">
               <a:rPr lang="en-US" dirty="0"/>
               <a:pPr/>
-              <a:t>11/10/2019</a:t>
+              <a:t>11/16/2019</a:t>
             </a:fld>
             <a:endParaRPr lang="en-US" dirty="0"/>
           </a:p>
@@ -2598,7 +2603,7 @@
             <a:fld id="{B61BEF0D-F0BB-DE4B-95CE-6DB70DBA9567}" type="datetimeFigureOut">
               <a:rPr lang="en-US" dirty="0"/>
               <a:pPr/>
-              <a:t>11/10/2019</a:t>
+              <a:t>11/16/2019</a:t>
             </a:fld>
             <a:endParaRPr lang="en-US" dirty="0"/>
           </a:p>
@@ -2857,7 +2862,7 @@
             <a:fld id="{B61BEF0D-F0BB-DE4B-95CE-6DB70DBA9567}" type="datetimeFigureOut">
               <a:rPr lang="en-US" dirty="0"/>
               <a:pPr/>
-              <a:t>11/10/2019</a:t>
+              <a:t>11/16/2019</a:t>
             </a:fld>
             <a:endParaRPr lang="en-US" dirty="0"/>
           </a:p>
@@ -3183,7 +3188,7 @@
             <a:fld id="{B61BEF0D-F0BB-DE4B-95CE-6DB70DBA9567}" type="datetimeFigureOut">
               <a:rPr lang="en-US" dirty="0"/>
               <a:pPr/>
-              <a:t>11/10/2019</a:t>
+              <a:t>11/16/2019</a:t>
             </a:fld>
             <a:endParaRPr lang="en-US" dirty="0"/>
           </a:p>
@@ -3503,7 +3508,7 @@
             <a:fld id="{B61BEF0D-F0BB-DE4B-95CE-6DB70DBA9567}" type="datetimeFigureOut">
               <a:rPr lang="en-US" dirty="0"/>
               <a:pPr/>
-              <a:t>11/10/2019</a:t>
+              <a:t>11/16/2019</a:t>
             </a:fld>
             <a:endParaRPr lang="en-US" dirty="0"/>
           </a:p>
@@ -3957,7 +3962,7 @@
             <a:fld id="{B61BEF0D-F0BB-DE4B-95CE-6DB70DBA9567}" type="datetimeFigureOut">
               <a:rPr lang="en-US" dirty="0"/>
               <a:pPr/>
-              <a:t>11/10/2019</a:t>
+              <a:t>11/16/2019</a:t>
             </a:fld>
             <a:endParaRPr lang="en-US" dirty="0"/>
           </a:p>
@@ -4159,7 +4164,7 @@
             <a:fld id="{B61BEF0D-F0BB-DE4B-95CE-6DB70DBA9567}" type="datetimeFigureOut">
               <a:rPr lang="en-US" dirty="0"/>
               <a:pPr/>
-              <a:t>11/10/2019</a:t>
+              <a:t>11/16/2019</a:t>
             </a:fld>
             <a:endParaRPr lang="en-US" dirty="0"/>
           </a:p>
@@ -4333,7 +4338,7 @@
             <a:fld id="{B61BEF0D-F0BB-DE4B-95CE-6DB70DBA9567}" type="datetimeFigureOut">
               <a:rPr lang="en-US" dirty="0"/>
               <a:pPr/>
-              <a:t>11/10/2019</a:t>
+              <a:t>11/16/2019</a:t>
             </a:fld>
             <a:endParaRPr lang="en-US" dirty="0"/>
           </a:p>
@@ -4663,7 +4668,7 @@
             <a:fld id="{B61BEF0D-F0BB-DE4B-95CE-6DB70DBA9567}" type="datetimeFigureOut">
               <a:rPr lang="en-US" dirty="0"/>
               <a:pPr/>
-              <a:t>11/10/2019</a:t>
+              <a:t>11/16/2019</a:t>
             </a:fld>
             <a:endParaRPr lang="en-US" dirty="0"/>
           </a:p>
@@ -5005,7 +5010,7 @@
             <a:fld id="{B61BEF0D-F0BB-DE4B-95CE-6DB70DBA9567}" type="datetimeFigureOut">
               <a:rPr lang="en-US" dirty="0"/>
               <a:pPr/>
-              <a:t>11/10/2019</a:t>
+              <a:t>11/16/2019</a:t>
             </a:fld>
             <a:endParaRPr lang="en-US" dirty="0"/>
           </a:p>
@@ -7119,7 +7124,7 @@
             <a:fld id="{B61BEF0D-F0BB-DE4B-95CE-6DB70DBA9567}" type="datetimeFigureOut">
               <a:rPr lang="en-US" dirty="0"/>
               <a:pPr/>
-              <a:t>11/10/2019</a:t>
+              <a:t>11/16/2019</a:t>
             </a:fld>
             <a:endParaRPr lang="en-US" dirty="0"/>
           </a:p>
@@ -8228,7 +8233,7 @@
         <p:spPr/>
         <p:txBody>
           <a:bodyPr>
-            <a:normAutofit fontScale="92500" lnSpcReduction="10000"/>
+            <a:normAutofit fontScale="85000" lnSpcReduction="20000"/>
           </a:bodyPr>
           <a:lstStyle/>
           <a:p>
@@ -8248,6 +8253,23 @@
               <a:rPr lang="en-US" dirty="0"/>
               <a:t>Developer mentor and developer community servant 😊</a:t>
             </a:r>
+          </a:p>
+          <a:p>
+            <a:r>
+              <a:rPr lang="en-US" dirty="0"/>
+              <a:t>Leading MUGI Jakarta since 2017</a:t>
+            </a:r>
+          </a:p>
+          <a:p>
+            <a:r>
+              <a:rPr lang="en-US" dirty="0"/>
+              <a:t>Leading Azure </a:t>
+            </a:r>
+            <a:r>
+              <a:rPr lang="en-US"/>
+              <a:t>DevOps Indonesia since March 2019</a:t>
+            </a:r>
+            <a:endParaRPr lang="en-US" dirty="0"/>
           </a:p>
           <a:p>
             <a:r>

</xml_diff>